<commit_message>
modify presentation files and Lesson Learned
</commit_message>
<xml_diff>
--- a/final-presentation/bts_final-presentaion_0801_draft3_HY.pptx
+++ b/final-presentation/bts_final-presentaion_0801_draft3_HY.pptx
@@ -5,15 +5,16 @@
     <p:sldMasterId id="2147483648" r:id="rId1"/>
   </p:sldMasterIdLst>
   <p:notesMasterIdLst>
-    <p:notesMasterId r:id="rId8"/>
+    <p:notesMasterId r:id="rId9"/>
   </p:notesMasterIdLst>
   <p:sldIdLst>
     <p:sldId id="270" r:id="rId2"/>
     <p:sldId id="300" r:id="rId3"/>
     <p:sldId id="301" r:id="rId4"/>
     <p:sldId id="308" r:id="rId5"/>
-    <p:sldId id="307" r:id="rId6"/>
-    <p:sldId id="293" r:id="rId7"/>
+    <p:sldId id="309" r:id="rId6"/>
+    <p:sldId id="307" r:id="rId7"/>
+    <p:sldId id="293" r:id="rId8"/>
   </p:sldIdLst>
   <p:sldSz cx="9144000" cy="6858000" type="screen4x3"/>
   <p:notesSz cx="6858000" cy="9144000"/>
@@ -121,6 +122,7 @@
             <p14:sldId id="300"/>
             <p14:sldId id="301"/>
             <p14:sldId id="308"/>
+            <p14:sldId id="309"/>
             <p14:sldId id="307"/>
             <p14:sldId id="293"/>
           </p14:sldIdLst>
@@ -720,42 +722,7 @@
           <a:bodyPr/>
           <a:lstStyle/>
           <a:p>
-            <a:r>
-              <a:rPr lang="ko-KR" altLang="en-US" dirty="0"/>
-              <a:t>예상 질문</a:t>
-            </a:r>
-            <a:endParaRPr lang="en-US" altLang="ko-KR" dirty="0"/>
-          </a:p>
-          <a:p>
-            <a:r>
-              <a:rPr lang="ko-KR" altLang="en-US" dirty="0" err="1"/>
-              <a:t>유닛테스트</a:t>
-            </a:r>
-            <a:r>
-              <a:rPr lang="ko-KR" altLang="en-US" dirty="0"/>
-              <a:t> 작성을 위해 </a:t>
-            </a:r>
-            <a:r>
-              <a:rPr lang="ko-KR" altLang="en-US" dirty="0" err="1"/>
-              <a:t>디테일한</a:t>
-            </a:r>
-            <a:r>
-              <a:rPr lang="ko-KR" altLang="en-US" dirty="0"/>
-              <a:t> </a:t>
-            </a:r>
-            <a:r>
-              <a:rPr lang="ko-KR" altLang="en-US" dirty="0" err="1"/>
-              <a:t>스펙을</a:t>
-            </a:r>
-            <a:r>
-              <a:rPr lang="ko-KR" altLang="en-US" dirty="0"/>
-              <a:t> 정리 했는가</a:t>
-            </a:r>
-            <a:r>
-              <a:rPr lang="en-US" altLang="ko-KR" dirty="0"/>
-              <a:t>?</a:t>
-            </a:r>
-            <a:endParaRPr lang="ko-KR" altLang="en-US" dirty="0"/>
+            <a:endParaRPr kumimoji="1" lang="ko-KR" altLang="en-US" dirty="0"/>
           </a:p>
         </p:txBody>
       </p:sp>
@@ -785,7 +752,7 @@
     </p:spTree>
     <p:extLst>
       <p:ext uri="{BB962C8B-B14F-4D97-AF65-F5344CB8AC3E}">
-        <p14:creationId xmlns:p14="http://schemas.microsoft.com/office/powerpoint/2010/main" val="2772092268"/>
+        <p14:creationId xmlns:p14="http://schemas.microsoft.com/office/powerpoint/2010/main" val="1495840769"/>
       </p:ext>
     </p:extLst>
   </p:cSld>
@@ -845,6 +812,37 @@
             </a:r>
             <a:endParaRPr lang="en-US" altLang="ko-KR" dirty="0"/>
           </a:p>
+          <a:p>
+            <a:r>
+              <a:rPr lang="ko-KR" altLang="en-US" dirty="0" err="1"/>
+              <a:t>유닛테스트</a:t>
+            </a:r>
+            <a:r>
+              <a:rPr lang="ko-KR" altLang="en-US" dirty="0"/>
+              <a:t> 작성을 위해 </a:t>
+            </a:r>
+            <a:r>
+              <a:rPr lang="ko-KR" altLang="en-US" dirty="0" err="1"/>
+              <a:t>디테일한</a:t>
+            </a:r>
+            <a:r>
+              <a:rPr lang="ko-KR" altLang="en-US" dirty="0"/>
+              <a:t> </a:t>
+            </a:r>
+            <a:r>
+              <a:rPr lang="ko-KR" altLang="en-US" dirty="0" err="1"/>
+              <a:t>스펙을</a:t>
+            </a:r>
+            <a:r>
+              <a:rPr lang="ko-KR" altLang="en-US" dirty="0"/>
+              <a:t> 정리 했는가</a:t>
+            </a:r>
+            <a:r>
+              <a:rPr lang="en-US" altLang="ko-KR" dirty="0"/>
+              <a:t>?</a:t>
+            </a:r>
+            <a:endParaRPr lang="ko-KR" altLang="en-US" dirty="0"/>
+          </a:p>
         </p:txBody>
       </p:sp>
       <p:sp>
@@ -865,6 +863,94 @@
             <a:fld id="{3AA2FE0F-B235-F44B-9384-2E1E3B262E89}" type="slidenum">
               <a:rPr kumimoji="1" lang="ko-KR" altLang="en-US" smtClean="0"/>
               <a:t>6</a:t>
+            </a:fld>
+            <a:endParaRPr kumimoji="1" lang="ko-KR" altLang="en-US"/>
+          </a:p>
+        </p:txBody>
+      </p:sp>
+    </p:spTree>
+    <p:extLst>
+      <p:ext uri="{BB962C8B-B14F-4D97-AF65-F5344CB8AC3E}">
+        <p14:creationId xmlns:p14="http://schemas.microsoft.com/office/powerpoint/2010/main" val="2772092268"/>
+      </p:ext>
+    </p:extLst>
+  </p:cSld>
+  <p:clrMapOvr>
+    <a:masterClrMapping/>
+  </p:clrMapOvr>
+</p:notes>
+</file>
+
+<file path=ppt/notesSlides/notesSlide5.xml><?xml version="1.0" encoding="utf-8"?>
+<p:notes xmlns:a="http://schemas.openxmlformats.org/drawingml/2006/main" xmlns:r="http://schemas.openxmlformats.org/officeDocument/2006/relationships" xmlns:p="http://schemas.openxmlformats.org/presentationml/2006/main">
+  <p:cSld>
+    <p:spTree>
+      <p:nvGrpSpPr>
+        <p:cNvPr id="1" name=""/>
+        <p:cNvGrpSpPr/>
+        <p:nvPr/>
+      </p:nvGrpSpPr>
+      <p:grpSpPr>
+        <a:xfrm>
+          <a:off x="0" y="0"/>
+          <a:ext cx="0" cy="0"/>
+          <a:chOff x="0" y="0"/>
+          <a:chExt cx="0" cy="0"/>
+        </a:xfrm>
+      </p:grpSpPr>
+      <p:sp>
+        <p:nvSpPr>
+          <p:cNvPr id="2" name="슬라이드 이미지 개체 틀 1"/>
+          <p:cNvSpPr>
+            <a:spLocks noGrp="1" noRot="1" noChangeAspect="1"/>
+          </p:cNvSpPr>
+          <p:nvPr>
+            <p:ph type="sldImg"/>
+          </p:nvPr>
+        </p:nvSpPr>
+        <p:spPr/>
+      </p:sp>
+      <p:sp>
+        <p:nvSpPr>
+          <p:cNvPr id="3" name="슬라이드 노트 개체 틀 2"/>
+          <p:cNvSpPr>
+            <a:spLocks noGrp="1"/>
+          </p:cNvSpPr>
+          <p:nvPr>
+            <p:ph type="body" idx="1"/>
+          </p:nvPr>
+        </p:nvSpPr>
+        <p:spPr/>
+        <p:txBody>
+          <a:bodyPr/>
+          <a:lstStyle/>
+          <a:p>
+            <a:r>
+              <a:rPr lang="ko-KR" altLang="en-US" dirty="0"/>
+              <a:t>예상 질문</a:t>
+            </a:r>
+            <a:endParaRPr lang="en-US" altLang="ko-KR" dirty="0"/>
+          </a:p>
+        </p:txBody>
+      </p:sp>
+      <p:sp>
+        <p:nvSpPr>
+          <p:cNvPr id="4" name="슬라이드 번호 개체 틀 3"/>
+          <p:cNvSpPr>
+            <a:spLocks noGrp="1"/>
+          </p:cNvSpPr>
+          <p:nvPr>
+            <p:ph type="sldNum" sz="quarter" idx="10"/>
+          </p:nvPr>
+        </p:nvSpPr>
+        <p:spPr/>
+        <p:txBody>
+          <a:bodyPr/>
+          <a:lstStyle/>
+          <a:p>
+            <a:fld id="{3AA2FE0F-B235-F44B-9384-2E1E3B262E89}" type="slidenum">
+              <a:rPr kumimoji="1" lang="ko-KR" altLang="en-US" smtClean="0"/>
+              <a:t>7</a:t>
             </a:fld>
             <a:endParaRPr kumimoji="1" lang="ko-KR" altLang="en-US"/>
           </a:p>
@@ -3856,7 +3942,7 @@
           <p:cNvPr id="16" name="그림 15">
             <a:extLst>
               <a:ext uri="{FF2B5EF4-FFF2-40B4-BE49-F238E27FC236}">
-                <a16:creationId xmlns:a16="http://schemas.microsoft.com/office/drawing/2014/main" xmlns="" id="{08326906-BADA-D546-B5EB-0B3FD0E33788}"/>
+                <a16:creationId xmlns="" xmlns:a16="http://schemas.microsoft.com/office/drawing/2014/main" id="{08326906-BADA-D546-B5EB-0B3FD0E33788}"/>
               </a:ext>
             </a:extLst>
           </p:cNvPr>
@@ -3892,7 +3978,7 @@
           <p:cNvPr id="7" name="AutoShape 2" descr="https://sdet-bts.atlassian.net/wiki/download/thumbnails/196610/IMG-7052.JPG?version=1&amp;modificationDate=1531539508835&amp;cacheVersion=1&amp;api=v2&amp;width=100">
             <a:extLst>
               <a:ext uri="{FF2B5EF4-FFF2-40B4-BE49-F238E27FC236}">
-                <a16:creationId xmlns:a16="http://schemas.microsoft.com/office/drawing/2014/main" xmlns="" id="{3E3EB99E-BC9F-8649-BC00-DD719F02A210}"/>
+                <a16:creationId xmlns="" xmlns:a16="http://schemas.microsoft.com/office/drawing/2014/main" id="{3E3EB99E-BC9F-8649-BC00-DD719F02A210}"/>
               </a:ext>
             </a:extLst>
           </p:cNvPr>
@@ -3937,7 +4023,7 @@
           <p:cNvPr id="9" name="AutoShape 3" descr="https://sdet-bts.atlassian.net/wiki/download/thumbnails/196610/IMG-7056.JPG?version=1&amp;modificationDate=1531539497859&amp;cacheVersion=1&amp;api=v2&amp;width=100">
             <a:extLst>
               <a:ext uri="{FF2B5EF4-FFF2-40B4-BE49-F238E27FC236}">
-                <a16:creationId xmlns:a16="http://schemas.microsoft.com/office/drawing/2014/main" xmlns="" id="{3DDF5B4F-EB0C-8645-B31C-EB08F27A637E}"/>
+                <a16:creationId xmlns="" xmlns:a16="http://schemas.microsoft.com/office/drawing/2014/main" id="{3DDF5B4F-EB0C-8645-B31C-EB08F27A637E}"/>
               </a:ext>
             </a:extLst>
           </p:cNvPr>
@@ -3982,7 +4068,7 @@
           <p:cNvPr id="15" name="TextBox 14">
             <a:extLst>
               <a:ext uri="{FF2B5EF4-FFF2-40B4-BE49-F238E27FC236}">
-                <a16:creationId xmlns:a16="http://schemas.microsoft.com/office/drawing/2014/main" xmlns="" id="{A046B8AF-E701-F948-80F0-187808BB4ED5}"/>
+                <a16:creationId xmlns="" xmlns:a16="http://schemas.microsoft.com/office/drawing/2014/main" id="{A046B8AF-E701-F948-80F0-187808BB4ED5}"/>
               </a:ext>
             </a:extLst>
           </p:cNvPr>
@@ -4056,7 +4142,7 @@
           <p:cNvPr id="5" name="슬라이드 번호 개체 틀 4">
             <a:extLst>
               <a:ext uri="{FF2B5EF4-FFF2-40B4-BE49-F238E27FC236}">
-                <a16:creationId xmlns:a16="http://schemas.microsoft.com/office/drawing/2014/main" xmlns="" id="{9FA75F19-B7A8-6A4F-A5D3-84D9FFF88627}"/>
+                <a16:creationId xmlns="" xmlns:a16="http://schemas.microsoft.com/office/drawing/2014/main" id="{9FA75F19-B7A8-6A4F-A5D3-84D9FFF88627}"/>
               </a:ext>
             </a:extLst>
           </p:cNvPr>
@@ -4085,7 +4171,7 @@
           <p:cNvPr id="6" name="TextBox 5">
             <a:extLst>
               <a:ext uri="{FF2B5EF4-FFF2-40B4-BE49-F238E27FC236}">
-                <a16:creationId xmlns:a16="http://schemas.microsoft.com/office/drawing/2014/main" xmlns="" id="{255C3C49-883C-204B-8A2C-B220C66630BD}"/>
+                <a16:creationId xmlns="" xmlns:a16="http://schemas.microsoft.com/office/drawing/2014/main" id="{255C3C49-883C-204B-8A2C-B220C66630BD}"/>
               </a:ext>
             </a:extLst>
           </p:cNvPr>
@@ -4547,7 +4633,7 @@
           <p:cNvPr id="7" name="TextBox 6">
             <a:extLst>
               <a:ext uri="{FF2B5EF4-FFF2-40B4-BE49-F238E27FC236}">
-                <a16:creationId xmlns:a16="http://schemas.microsoft.com/office/drawing/2014/main" xmlns="" id="{B4B1FE1F-6CD7-654F-8F56-C2F661931D17}"/>
+                <a16:creationId xmlns="" xmlns:a16="http://schemas.microsoft.com/office/drawing/2014/main" id="{B4B1FE1F-6CD7-654F-8F56-C2F661931D17}"/>
               </a:ext>
             </a:extLst>
           </p:cNvPr>
@@ -4605,7 +4691,7 @@
           <p:cNvPr id="8" name="그림 7">
             <a:extLst>
               <a:ext uri="{FF2B5EF4-FFF2-40B4-BE49-F238E27FC236}">
-                <a16:creationId xmlns:a16="http://schemas.microsoft.com/office/drawing/2014/main" xmlns="" id="{434B5C57-8B8B-1A4A-B338-3D39BA11B5B9}"/>
+                <a16:creationId xmlns="" xmlns:a16="http://schemas.microsoft.com/office/drawing/2014/main" id="{434B5C57-8B8B-1A4A-B338-3D39BA11B5B9}"/>
               </a:ext>
             </a:extLst>
           </p:cNvPr>
@@ -4678,7 +4764,7 @@
           <p:cNvPr id="5" name="슬라이드 번호 개체 틀 4">
             <a:extLst>
               <a:ext uri="{FF2B5EF4-FFF2-40B4-BE49-F238E27FC236}">
-                <a16:creationId xmlns:a16="http://schemas.microsoft.com/office/drawing/2014/main" xmlns="" id="{9FA75F19-B7A8-6A4F-A5D3-84D9FFF88627}"/>
+                <a16:creationId xmlns="" xmlns:a16="http://schemas.microsoft.com/office/drawing/2014/main" id="{9FA75F19-B7A8-6A4F-A5D3-84D9FFF88627}"/>
               </a:ext>
             </a:extLst>
           </p:cNvPr>
@@ -4707,7 +4793,7 @@
           <p:cNvPr id="6" name="TextBox 5">
             <a:extLst>
               <a:ext uri="{FF2B5EF4-FFF2-40B4-BE49-F238E27FC236}">
-                <a16:creationId xmlns:a16="http://schemas.microsoft.com/office/drawing/2014/main" xmlns="" id="{255C3C49-883C-204B-8A2C-B220C66630BD}"/>
+                <a16:creationId xmlns="" xmlns:a16="http://schemas.microsoft.com/office/drawing/2014/main" id="{255C3C49-883C-204B-8A2C-B220C66630BD}"/>
               </a:ext>
             </a:extLst>
           </p:cNvPr>
@@ -4716,8 +4802,8 @@
         </p:nvSpPr>
         <p:spPr>
           <a:xfrm>
-            <a:off x="179512" y="613537"/>
-            <a:ext cx="8496944" cy="6127831"/>
+            <a:off x="179512" y="506395"/>
+            <a:ext cx="8496944" cy="6081665"/>
           </a:xfrm>
           <a:prstGeom prst="rect">
             <a:avLst/>
@@ -4806,8 +4892,12 @@
                 <a:latin typeface="Arial" panose="020B0604020202020204" pitchFamily="34" charset="0"/>
                 <a:cs typeface="Arial" panose="020B0604020202020204" pitchFamily="34" charset="0"/>
               </a:rPr>
-              <a:t>Planned Effort : 5h (7/23, 1 member, 5 hours)</a:t>
-            </a:r>
+              <a:t>Planned Effort : 5h </a:t>
+            </a:r>
+            <a:endParaRPr lang="en-US" altLang="ko-KR" sz="1600" dirty="0" smtClean="0">
+              <a:latin typeface="Arial" panose="020B0604020202020204" pitchFamily="34" charset="0"/>
+              <a:cs typeface="Arial" panose="020B0604020202020204" pitchFamily="34" charset="0"/>
+            </a:endParaRPr>
           </a:p>
           <a:p>
             <a:pPr marL="742950" lvl="1" indent="-285750">
@@ -4818,11 +4908,55 @@
               <a:buChar char="ü"/>
             </a:pPr>
             <a:r>
+              <a:rPr lang="en-US" altLang="ko-KR" sz="1600" dirty="0" smtClean="0">
+                <a:latin typeface="Arial" panose="020B0604020202020204" pitchFamily="34" charset="0"/>
+                <a:cs typeface="Arial" panose="020B0604020202020204" pitchFamily="34" charset="0"/>
+              </a:rPr>
+              <a:t>Estimated / </a:t>
+            </a:r>
+            <a:r>
+              <a:rPr lang="en-US" altLang="ko-KR" sz="1600" dirty="0" smtClean="0">
+                <a:latin typeface="Arial" panose="020B0604020202020204" pitchFamily="34" charset="0"/>
+                <a:cs typeface="Arial" panose="020B0604020202020204" pitchFamily="34" charset="0"/>
+              </a:rPr>
+              <a:t>Actual</a:t>
+            </a:r>
+            <a:r>
+              <a:rPr lang="en-US" altLang="ko-KR" sz="1600" dirty="0" smtClean="0">
+                <a:latin typeface="Arial" panose="020B0604020202020204" pitchFamily="34" charset="0"/>
+                <a:cs typeface="Arial" panose="020B0604020202020204" pitchFamily="34" charset="0"/>
+              </a:rPr>
+              <a:t> </a:t>
+            </a:r>
+            <a:r>
               <a:rPr lang="en-US" altLang="ko-KR" sz="1600" dirty="0">
                 <a:latin typeface="Arial" panose="020B0604020202020204" pitchFamily="34" charset="0"/>
                 <a:cs typeface="Arial" panose="020B0604020202020204" pitchFamily="34" charset="0"/>
               </a:rPr>
-              <a:t>Estimated Effort :  10h (7/23, 2 members, each 5hours)</a:t>
+              <a:t>Effort :  10h </a:t>
+            </a:r>
+            <a:r>
+              <a:rPr lang="en-US" altLang="ko-KR" sz="1600" dirty="0" smtClean="0">
+                <a:latin typeface="Arial" panose="020B0604020202020204" pitchFamily="34" charset="0"/>
+                <a:cs typeface="Arial" panose="020B0604020202020204" pitchFamily="34" charset="0"/>
+              </a:rPr>
+              <a:t>/ 11h </a:t>
+            </a:r>
+          </a:p>
+          <a:p>
+            <a:pPr marL="285750" indent="-285750">
+              <a:lnSpc>
+                <a:spcPct val="130000"/>
+              </a:lnSpc>
+              <a:buFont typeface="Arial" panose="020B0604020202020204" pitchFamily="34" charset="0"/>
+              <a:buChar char="•"/>
+            </a:pPr>
+            <a:r>
+              <a:rPr lang="en-US" altLang="ko-KR" sz="1600" b="1" dirty="0" smtClean="0">
+                <a:latin typeface="Arial" panose="020B0604020202020204" pitchFamily="34" charset="0"/>
+                <a:cs typeface="Arial" panose="020B0604020202020204" pitchFamily="34" charset="0"/>
+              </a:rPr>
+              <a:t>Outputs (ref. appendix.4)</a:t>
             </a:r>
           </a:p>
           <a:p>
@@ -4834,12 +4968,139 @@
               <a:buChar char="ü"/>
             </a:pPr>
             <a:r>
-              <a:rPr lang="en-US" altLang="ko-KR" sz="1600" dirty="0">
-                <a:latin typeface="Arial" panose="020B0604020202020204" pitchFamily="34" charset="0"/>
-                <a:cs typeface="Arial" panose="020B0604020202020204" pitchFamily="34" charset="0"/>
-              </a:rPr>
-              <a:t>Actual : 11h (7/23 , 2 members, 6hours + 5hours ) </a:t>
-            </a:r>
+              <a:rPr lang="en-US" altLang="ko-KR" sz="1400" dirty="0" smtClean="0">
+                <a:latin typeface="Arial" panose="020B0604020202020204" pitchFamily="34" charset="0"/>
+                <a:cs typeface="Arial" panose="020B0604020202020204" pitchFamily="34" charset="0"/>
+              </a:rPr>
+              <a:t>affected </a:t>
+            </a:r>
+            <a:r>
+              <a:rPr lang="en-US" altLang="ko-KR" sz="1400" dirty="0" smtClean="0">
+                <a:latin typeface="Arial" panose="020B0604020202020204" pitchFamily="34" charset="0"/>
+                <a:cs typeface="Arial" panose="020B0604020202020204" pitchFamily="34" charset="0"/>
+              </a:rPr>
+              <a:t>Unit Test Case : GameTest.java - 46 , </a:t>
+            </a:r>
+            <a:r>
+              <a:rPr lang="en-US" altLang="ko-KR" sz="1400" dirty="0" err="1" smtClean="0">
+                <a:latin typeface="Arial" panose="020B0604020202020204" pitchFamily="34" charset="0"/>
+                <a:cs typeface="Arial" panose="020B0604020202020204" pitchFamily="34" charset="0"/>
+              </a:rPr>
+              <a:t>ItemTest</a:t>
+            </a:r>
+            <a:r>
+              <a:rPr lang="en-US" altLang="ko-KR" sz="1400" dirty="0" smtClean="0">
+                <a:latin typeface="Arial" panose="020B0604020202020204" pitchFamily="34" charset="0"/>
+                <a:cs typeface="Arial" panose="020B0604020202020204" pitchFamily="34" charset="0"/>
+              </a:rPr>
+              <a:t> - 3, PlayerTest.java - 4</a:t>
+            </a:r>
+          </a:p>
+          <a:p>
+            <a:pPr marL="742950" lvl="1" indent="-285750">
+              <a:lnSpc>
+                <a:spcPct val="150000"/>
+              </a:lnSpc>
+              <a:buFont typeface="Wingdings" pitchFamily="2" charset="2"/>
+              <a:buChar char="ü"/>
+            </a:pPr>
+            <a:r>
+              <a:rPr lang="en-US" altLang="ko-KR" sz="1400" dirty="0" smtClean="0">
+                <a:latin typeface="Arial" panose="020B0604020202020204" pitchFamily="34" charset="0"/>
+                <a:cs typeface="Arial" panose="020B0604020202020204" pitchFamily="34" charset="0"/>
+              </a:rPr>
+              <a:t>Mutation </a:t>
+            </a:r>
+            <a:r>
+              <a:rPr lang="en-US" altLang="ko-KR" sz="1400" dirty="0">
+                <a:latin typeface="Arial" panose="020B0604020202020204" pitchFamily="34" charset="0"/>
+                <a:cs typeface="Arial" panose="020B0604020202020204" pitchFamily="34" charset="0"/>
+              </a:rPr>
+              <a:t>Test Result Report (PIT Summary</a:t>
+            </a:r>
+            <a:r>
+              <a:rPr lang="en-US" altLang="ko-KR" sz="1400" dirty="0" smtClean="0">
+                <a:latin typeface="Arial" panose="020B0604020202020204" pitchFamily="34" charset="0"/>
+                <a:cs typeface="Arial" panose="020B0604020202020204" pitchFamily="34" charset="0"/>
+              </a:rPr>
+              <a:t>)</a:t>
+            </a:r>
+          </a:p>
+          <a:p>
+            <a:pPr marL="742950" lvl="1" indent="-285750">
+              <a:lnSpc>
+                <a:spcPct val="150000"/>
+              </a:lnSpc>
+              <a:buFont typeface="Wingdings" pitchFamily="2" charset="2"/>
+              <a:buChar char="ü"/>
+            </a:pPr>
+            <a:r>
+              <a:rPr lang="en-US" altLang="ko-KR" sz="1400" b="1" dirty="0">
+                <a:latin typeface="Arial" panose="020B0604020202020204" pitchFamily="34" charset="0"/>
+                <a:cs typeface="Arial" panose="020B0604020202020204" pitchFamily="34" charset="0"/>
+              </a:rPr>
+              <a:t>Mutation coverage : 55</a:t>
+            </a:r>
+            <a:r>
+              <a:rPr lang="ko-KR" altLang="en-US" sz="1400" b="1">
+                <a:latin typeface="Arial" panose="020B0604020202020204" pitchFamily="34" charset="0"/>
+                <a:cs typeface="Arial" panose="020B0604020202020204" pitchFamily="34" charset="0"/>
+              </a:rPr>
+              <a:t> </a:t>
+            </a:r>
+            <a:r>
+              <a:rPr lang="en-US" altLang="ko-KR" sz="1400" b="1" dirty="0">
+                <a:latin typeface="Arial" panose="020B0604020202020204" pitchFamily="34" charset="0"/>
+                <a:cs typeface="Arial" panose="020B0604020202020204" pitchFamily="34" charset="0"/>
+              </a:rPr>
+              <a:t>-&gt;</a:t>
+            </a:r>
+            <a:r>
+              <a:rPr lang="ko-KR" altLang="en-US" sz="1400" b="1">
+                <a:latin typeface="Arial" panose="020B0604020202020204" pitchFamily="34" charset="0"/>
+                <a:cs typeface="Arial" panose="020B0604020202020204" pitchFamily="34" charset="0"/>
+              </a:rPr>
+              <a:t> </a:t>
+            </a:r>
+            <a:r>
+              <a:rPr lang="en-US" altLang="ko-KR" sz="1400" b="1" dirty="0">
+                <a:latin typeface="Arial" panose="020B0604020202020204" pitchFamily="34" charset="0"/>
+                <a:cs typeface="Arial" panose="020B0604020202020204" pitchFamily="34" charset="0"/>
+              </a:rPr>
+              <a:t>71.3</a:t>
+            </a:r>
+            <a:r>
+              <a:rPr lang="ko-KR" altLang="en-US" sz="1400" b="1">
+                <a:latin typeface="Arial" panose="020B0604020202020204" pitchFamily="34" charset="0"/>
+                <a:cs typeface="Arial" panose="020B0604020202020204" pitchFamily="34" charset="0"/>
+              </a:rPr>
+              <a:t> </a:t>
+            </a:r>
+            <a:r>
+              <a:rPr lang="en-US" altLang="ko-KR" sz="1400" b="1" dirty="0">
+                <a:latin typeface="Arial" panose="020B0604020202020204" pitchFamily="34" charset="0"/>
+                <a:cs typeface="Arial" panose="020B0604020202020204" pitchFamily="34" charset="0"/>
+              </a:rPr>
+              <a:t>% </a:t>
+            </a:r>
+            <a:r>
+              <a:rPr lang="en-US" altLang="ko-KR" sz="1400" dirty="0">
+                <a:latin typeface="Arial" panose="020B0604020202020204" pitchFamily="34" charset="0"/>
+                <a:cs typeface="Arial" panose="020B0604020202020204" pitchFamily="34" charset="0"/>
+              </a:rPr>
+              <a:t>(for Game, Player, Item classes</a:t>
+            </a:r>
+            <a:r>
+              <a:rPr lang="en-US" altLang="ko-KR" sz="1400" dirty="0" smtClean="0">
+                <a:latin typeface="Arial" panose="020B0604020202020204" pitchFamily="34" charset="0"/>
+                <a:cs typeface="Arial" panose="020B0604020202020204" pitchFamily="34" charset="0"/>
+              </a:rPr>
+              <a:t>)</a:t>
+            </a:r>
+            <a:endParaRPr lang="en-US" altLang="ko-KR" sz="1400" b="1" dirty="0">
+              <a:latin typeface="Arial" panose="020B0604020202020204" pitchFamily="34" charset="0"/>
+              <a:cs typeface="Arial" panose="020B0604020202020204" pitchFamily="34" charset="0"/>
+            </a:endParaRPr>
           </a:p>
           <a:p>
             <a:pPr marL="285750" indent="-285750">
@@ -4854,16 +5115,9 @@
                 <a:latin typeface="Arial" panose="020B0604020202020204" pitchFamily="34" charset="0"/>
                 <a:cs typeface="Arial" panose="020B0604020202020204" pitchFamily="34" charset="0"/>
               </a:rPr>
-              <a:t>Outputs (ref. </a:t>
-            </a:r>
-            <a:r>
-              <a:rPr lang="en-US" altLang="ko-KR" sz="1600" b="1" dirty="0" smtClean="0">
-                <a:latin typeface="Arial" panose="020B0604020202020204" pitchFamily="34" charset="0"/>
-                <a:cs typeface="Arial" panose="020B0604020202020204" pitchFamily="34" charset="0"/>
-              </a:rPr>
-              <a:t>appendix.4)</a:t>
-            </a:r>
-            <a:endParaRPr lang="en-US" altLang="ko-KR" sz="1600" b="1" dirty="0">
+              <a:t>Lessons Learned  </a:t>
+            </a:r>
+            <a:endParaRPr lang="en-US" altLang="ko-KR" sz="1700" b="1" dirty="0">
               <a:latin typeface="Arial" panose="020B0604020202020204" pitchFamily="34" charset="0"/>
               <a:cs typeface="Arial" panose="020B0604020202020204" pitchFamily="34" charset="0"/>
             </a:endParaRPr>
@@ -4877,25 +5131,27 @@
               <a:buChar char="ü"/>
             </a:pPr>
             <a:r>
+              <a:rPr lang="en-US" altLang="ko-KR" sz="1400" dirty="0">
+                <a:latin typeface="Arial" panose="020B0604020202020204" pitchFamily="34" charset="0"/>
+                <a:cs typeface="Arial" panose="020B0604020202020204" pitchFamily="34" charset="0"/>
+              </a:rPr>
+              <a:t>Improvement of Mutation coverage was not directly related to improvement of Unit Test defect detection. </a:t>
+            </a:r>
+            <a:r>
               <a:rPr lang="en-US" altLang="ko-KR" sz="1400" dirty="0" smtClean="0">
                 <a:latin typeface="Arial" panose="020B0604020202020204" pitchFamily="34" charset="0"/>
                 <a:cs typeface="Arial" panose="020B0604020202020204" pitchFamily="34" charset="0"/>
-              </a:rPr>
-              <a:t>affected Unit Test Case : GameTest.java - 46 , </a:t>
-            </a:r>
-            <a:r>
-              <a:rPr lang="en-US" altLang="ko-KR" sz="1400" dirty="0" err="1" smtClean="0">
-                <a:latin typeface="Arial" panose="020B0604020202020204" pitchFamily="34" charset="0"/>
-                <a:cs typeface="Arial" panose="020B0604020202020204" pitchFamily="34" charset="0"/>
-              </a:rPr>
-              <a:t>ItemTest</a:t>
-            </a:r>
-            <a:r>
-              <a:rPr lang="en-US" altLang="ko-KR" sz="1400" dirty="0" smtClean="0">
-                <a:latin typeface="Arial" panose="020B0604020202020204" pitchFamily="34" charset="0"/>
-                <a:cs typeface="Arial" panose="020B0604020202020204" pitchFamily="34" charset="0"/>
-              </a:rPr>
-              <a:t> - 3, PlayerTest.java - 4</a:t>
+                <a:sym typeface="Wingdings" panose="05000000000000000000" pitchFamily="2" charset="2"/>
+              </a:rPr>
+              <a:t> selectively </a:t>
+            </a:r>
+            <a:r>
+              <a:rPr lang="en-US" altLang="ko-KR" sz="1400" dirty="0">
+                <a:latin typeface="Arial" panose="020B0604020202020204" pitchFamily="34" charset="0"/>
+                <a:cs typeface="Arial" panose="020B0604020202020204" pitchFamily="34" charset="0"/>
+                <a:sym typeface="Wingdings" panose="05000000000000000000" pitchFamily="2" charset="2"/>
+              </a:rPr>
+              <a:t>handle the remaining test case bugs provided by the PIT.</a:t>
             </a:r>
           </a:p>
           <a:p>
@@ -4911,39 +5167,22 @@
                 <a:latin typeface="Arial" panose="020B0604020202020204" pitchFamily="34" charset="0"/>
                 <a:cs typeface="Arial" panose="020B0604020202020204" pitchFamily="34" charset="0"/>
               </a:rPr>
-              <a:t>Mutation </a:t>
+              <a:t>explicit </a:t>
             </a:r>
             <a:r>
               <a:rPr lang="en-US" altLang="ko-KR" sz="1400" dirty="0">
                 <a:latin typeface="Arial" panose="020B0604020202020204" pitchFamily="34" charset="0"/>
                 <a:cs typeface="Arial" panose="020B0604020202020204" pitchFamily="34" charset="0"/>
               </a:rPr>
-              <a:t>Test Result Report (PIT Summary)</a:t>
-            </a:r>
-            <a:endParaRPr lang="en-US" altLang="ko-KR" sz="1400" b="1" dirty="0">
-              <a:latin typeface="Arial" panose="020B0604020202020204" pitchFamily="34" charset="0"/>
-              <a:cs typeface="Arial" panose="020B0604020202020204" pitchFamily="34" charset="0"/>
-            </a:endParaRPr>
-          </a:p>
-          <a:p>
-            <a:pPr marL="285750" indent="-285750">
-              <a:lnSpc>
-                <a:spcPct val="130000"/>
-              </a:lnSpc>
-              <a:buFont typeface="Arial" panose="020B0604020202020204" pitchFamily="34" charset="0"/>
-              <a:buChar char="•"/>
-            </a:pPr>
-            <a:r>
-              <a:rPr lang="en-US" altLang="ko-KR" sz="1600" b="1" dirty="0">
-                <a:latin typeface="Arial" panose="020B0604020202020204" pitchFamily="34" charset="0"/>
-                <a:cs typeface="Arial" panose="020B0604020202020204" pitchFamily="34" charset="0"/>
-              </a:rPr>
-              <a:t>Lessons Learned  </a:t>
-            </a:r>
-            <a:endParaRPr lang="en-US" altLang="ko-KR" sz="1700" b="1" dirty="0">
-              <a:latin typeface="Arial" panose="020B0604020202020204" pitchFamily="34" charset="0"/>
-              <a:cs typeface="Arial" panose="020B0604020202020204" pitchFamily="34" charset="0"/>
-            </a:endParaRPr>
+              <a:t>unit test case implementation of the parts to be checked and the degree of stub processing affected the mutation coverage</a:t>
+            </a:r>
+            <a:r>
+              <a:rPr lang="en-US" altLang="ko-KR" sz="1400" dirty="0" smtClean="0">
+                <a:latin typeface="Arial" panose="020B0604020202020204" pitchFamily="34" charset="0"/>
+                <a:cs typeface="Arial" panose="020B0604020202020204" pitchFamily="34" charset="0"/>
+              </a:rPr>
+              <a:t>.</a:t>
+            </a:r>
           </a:p>
           <a:p>
             <a:pPr marL="742950" lvl="1" indent="-285750">
@@ -4955,68 +5194,6 @@
             </a:pPr>
             <a:r>
               <a:rPr lang="en-US" altLang="ko-KR" sz="1400" dirty="0">
-                <a:latin typeface="Arial" panose="020B0604020202020204" pitchFamily="34" charset="0"/>
-                <a:cs typeface="Arial" panose="020B0604020202020204" pitchFamily="34" charset="0"/>
-              </a:rPr>
-              <a:t>Improvement of Mutation coverage was not directly related to improvement of Unit Test defect detection. </a:t>
-            </a:r>
-            <a:r>
-              <a:rPr lang="en-US" altLang="ko-KR" sz="1400" dirty="0" smtClean="0">
-                <a:latin typeface="Arial" panose="020B0604020202020204" pitchFamily="34" charset="0"/>
-                <a:cs typeface="Arial" panose="020B0604020202020204" pitchFamily="34" charset="0"/>
-                <a:sym typeface="Wingdings" panose="05000000000000000000" pitchFamily="2" charset="2"/>
-              </a:rPr>
-              <a:t> selectively </a:t>
-            </a:r>
-            <a:r>
-              <a:rPr lang="en-US" altLang="ko-KR" sz="1400" dirty="0">
-                <a:latin typeface="Arial" panose="020B0604020202020204" pitchFamily="34" charset="0"/>
-                <a:cs typeface="Arial" panose="020B0604020202020204" pitchFamily="34" charset="0"/>
-                <a:sym typeface="Wingdings" panose="05000000000000000000" pitchFamily="2" charset="2"/>
-              </a:rPr>
-              <a:t>handle the remaining test case bugs provided by the PIT.</a:t>
-            </a:r>
-          </a:p>
-          <a:p>
-            <a:pPr marL="742950" lvl="1" indent="-285750">
-              <a:lnSpc>
-                <a:spcPct val="150000"/>
-              </a:lnSpc>
-              <a:buFont typeface="Wingdings" pitchFamily="2" charset="2"/>
-              <a:buChar char="ü"/>
-            </a:pPr>
-            <a:r>
-              <a:rPr lang="en-US" altLang="ko-KR" sz="1400" dirty="0" smtClean="0">
-                <a:latin typeface="Arial" panose="020B0604020202020204" pitchFamily="34" charset="0"/>
-                <a:cs typeface="Arial" panose="020B0604020202020204" pitchFamily="34" charset="0"/>
-              </a:rPr>
-              <a:t>explicit </a:t>
-            </a:r>
-            <a:r>
-              <a:rPr lang="en-US" altLang="ko-KR" sz="1400" dirty="0">
-                <a:latin typeface="Arial" panose="020B0604020202020204" pitchFamily="34" charset="0"/>
-                <a:cs typeface="Arial" panose="020B0604020202020204" pitchFamily="34" charset="0"/>
-              </a:rPr>
-              <a:t>unit test case implementation of the parts to be checked and the degree of stub processing affected the mutation coverage</a:t>
-            </a:r>
-            <a:r>
-              <a:rPr lang="en-US" altLang="ko-KR" sz="1400" dirty="0" smtClean="0">
-                <a:latin typeface="Arial" panose="020B0604020202020204" pitchFamily="34" charset="0"/>
-                <a:cs typeface="Arial" panose="020B0604020202020204" pitchFamily="34" charset="0"/>
-              </a:rPr>
-              <a:t>.</a:t>
-            </a:r>
-          </a:p>
-          <a:p>
-            <a:pPr marL="742950" lvl="1" indent="-285750">
-              <a:lnSpc>
-                <a:spcPct val="150000"/>
-              </a:lnSpc>
-              <a:buFont typeface="Wingdings" pitchFamily="2" charset="2"/>
-              <a:buChar char="ü"/>
-            </a:pPr>
-            <a:r>
-              <a:rPr lang="en-US" altLang="ko-KR" sz="1400" dirty="0">
                 <a:solidFill>
                   <a:srgbClr val="FF0000"/>
                 </a:solidFill>
@@ -5118,7 +5295,7 @@
           <p:cNvPr id="7" name="TextBox 6">
             <a:extLst>
               <a:ext uri="{FF2B5EF4-FFF2-40B4-BE49-F238E27FC236}">
-                <a16:creationId xmlns:a16="http://schemas.microsoft.com/office/drawing/2014/main" xmlns="" id="{B4B1FE1F-6CD7-654F-8F56-C2F661931D17}"/>
+                <a16:creationId xmlns="" xmlns:a16="http://schemas.microsoft.com/office/drawing/2014/main" id="{B4B1FE1F-6CD7-654F-8F56-C2F661931D17}"/>
               </a:ext>
             </a:extLst>
           </p:cNvPr>
@@ -5166,7 +5343,7 @@
           <p:cNvPr id="8" name="그림 7">
             <a:extLst>
               <a:ext uri="{FF2B5EF4-FFF2-40B4-BE49-F238E27FC236}">
-                <a16:creationId xmlns:a16="http://schemas.microsoft.com/office/drawing/2014/main" xmlns="" id="{434B5C57-8B8B-1A4A-B338-3D39BA11B5B9}"/>
+                <a16:creationId xmlns="" xmlns:a16="http://schemas.microsoft.com/office/drawing/2014/main" id="{434B5C57-8B8B-1A4A-B338-3D39BA11B5B9}"/>
               </a:ext>
             </a:extLst>
           </p:cNvPr>
@@ -5283,7 +5460,7 @@
           <p:cNvPr id="5" name="슬라이드 번호 개체 틀 4">
             <a:extLst>
               <a:ext uri="{FF2B5EF4-FFF2-40B4-BE49-F238E27FC236}">
-                <a16:creationId xmlns:a16="http://schemas.microsoft.com/office/drawing/2014/main" xmlns="" id="{9FA75F19-B7A8-6A4F-A5D3-84D9FFF88627}"/>
+                <a16:creationId xmlns="" xmlns:a16="http://schemas.microsoft.com/office/drawing/2014/main" id="{9FA75F19-B7A8-6A4F-A5D3-84D9FFF88627}"/>
               </a:ext>
             </a:extLst>
           </p:cNvPr>
@@ -5318,7 +5495,7 @@
           <p:cNvPr id="6" name="TextBox 5">
             <a:extLst>
               <a:ext uri="{FF2B5EF4-FFF2-40B4-BE49-F238E27FC236}">
-                <a16:creationId xmlns:a16="http://schemas.microsoft.com/office/drawing/2014/main" xmlns="" id="{255C3C49-883C-204B-8A2C-B220C66630BD}"/>
+                <a16:creationId xmlns="" xmlns:a16="http://schemas.microsoft.com/office/drawing/2014/main" id="{255C3C49-883C-204B-8A2C-B220C66630BD}"/>
               </a:ext>
             </a:extLst>
           </p:cNvPr>
@@ -5328,7 +5505,7 @@
         <p:spPr>
           <a:xfrm>
             <a:off x="256071" y="764704"/>
-            <a:ext cx="8496944" cy="6140142"/>
+            <a:ext cx="8496944" cy="5770811"/>
           </a:xfrm>
           <a:prstGeom prst="rect">
             <a:avLst/>
@@ -5483,41 +5660,28 @@
                 <a:latin typeface="Arial" panose="020B0604020202020204" pitchFamily="34" charset="0"/>
                 <a:cs typeface="Arial" panose="020B0604020202020204" pitchFamily="34" charset="0"/>
               </a:rPr>
-              <a:t>Estimated Effort : 46.5h</a:t>
-            </a:r>
-            <a:endParaRPr lang="en-US" altLang="ko-KR" sz="1600" dirty="0">
-              <a:latin typeface="Arial" panose="020B0604020202020204" pitchFamily="34" charset="0"/>
-              <a:cs typeface="Arial" panose="020B0604020202020204" pitchFamily="34" charset="0"/>
-            </a:endParaRPr>
-          </a:p>
-          <a:p>
-            <a:pPr marL="742950" lvl="1" indent="-285750">
-              <a:lnSpc>
-                <a:spcPct val="150000"/>
-              </a:lnSpc>
-              <a:buFont typeface="Wingdings" pitchFamily="2" charset="2"/>
-              <a:buChar char="ü"/>
-            </a:pPr>
+              <a:t>Estimated </a:t>
+            </a:r>
             <a:r>
               <a:rPr lang="en-US" altLang="ko-KR" sz="1600" dirty="0" smtClean="0">
                 <a:latin typeface="Arial" panose="020B0604020202020204" pitchFamily="34" charset="0"/>
                 <a:cs typeface="Arial" panose="020B0604020202020204" pitchFamily="34" charset="0"/>
               </a:rPr>
-              <a:t>Actual </a:t>
-            </a:r>
-            <a:r>
-              <a:rPr lang="en-US" altLang="ko-KR" sz="1600" dirty="0">
-                <a:latin typeface="Arial" panose="020B0604020202020204" pitchFamily="34" charset="0"/>
-                <a:cs typeface="Arial" panose="020B0604020202020204" pitchFamily="34" charset="0"/>
-              </a:rPr>
-              <a:t>Effort : </a:t>
+              <a:t>/ Actual Effort </a:t>
             </a:r>
             <a:r>
               <a:rPr lang="en-US" altLang="ko-KR" sz="1600" dirty="0" smtClean="0">
                 <a:latin typeface="Arial" panose="020B0604020202020204" pitchFamily="34" charset="0"/>
                 <a:cs typeface="Arial" panose="020B0604020202020204" pitchFamily="34" charset="0"/>
               </a:rPr>
-              <a:t>27.5h</a:t>
+              <a:t>: </a:t>
+            </a:r>
+            <a:r>
+              <a:rPr lang="en-US" altLang="ko-KR" sz="1600" dirty="0" smtClean="0">
+                <a:latin typeface="Arial" panose="020B0604020202020204" pitchFamily="34" charset="0"/>
+                <a:cs typeface="Arial" panose="020B0604020202020204" pitchFamily="34" charset="0"/>
+              </a:rPr>
+              <a:t>46.5h / 27.5h</a:t>
             </a:r>
             <a:endParaRPr lang="en-US" altLang="ko-KR" sz="1600" dirty="0">
               <a:latin typeface="Arial" panose="020B0604020202020204" pitchFamily="34" charset="0"/>
@@ -5793,7 +5957,7 @@
           <p:cNvPr id="7" name="TextBox 6">
             <a:extLst>
               <a:ext uri="{FF2B5EF4-FFF2-40B4-BE49-F238E27FC236}">
-                <a16:creationId xmlns:a16="http://schemas.microsoft.com/office/drawing/2014/main" xmlns="" id="{B4B1FE1F-6CD7-654F-8F56-C2F661931D17}"/>
+                <a16:creationId xmlns="" xmlns:a16="http://schemas.microsoft.com/office/drawing/2014/main" id="{B4B1FE1F-6CD7-654F-8F56-C2F661931D17}"/>
               </a:ext>
             </a:extLst>
           </p:cNvPr>
@@ -5851,7 +6015,7 @@
           <p:cNvPr id="8" name="그림 7">
             <a:extLst>
               <a:ext uri="{FF2B5EF4-FFF2-40B4-BE49-F238E27FC236}">
-                <a16:creationId xmlns:a16="http://schemas.microsoft.com/office/drawing/2014/main" xmlns="" id="{434B5C57-8B8B-1A4A-B338-3D39BA11B5B9}"/>
+                <a16:creationId xmlns="" xmlns:a16="http://schemas.microsoft.com/office/drawing/2014/main" id="{434B5C57-8B8B-1A4A-B338-3D39BA11B5B9}"/>
               </a:ext>
             </a:extLst>
           </p:cNvPr>
@@ -5935,7 +6099,12 @@
             <p:ph type="sldNum" sz="quarter" idx="12"/>
           </p:nvPr>
         </p:nvSpPr>
-        <p:spPr/>
+        <p:spPr>
+          <a:xfrm>
+            <a:off x="6553200" y="6356350"/>
+            <a:ext cx="2133600" cy="365125"/>
+          </a:xfrm>
+        </p:spPr>
         <p:txBody>
           <a:bodyPr/>
           <a:lstStyle/>
@@ -5954,6 +6123,308 @@
             <a:extLst>
               <a:ext uri="{FF2B5EF4-FFF2-40B4-BE49-F238E27FC236}">
                 <a16:creationId xmlns:a16="http://schemas.microsoft.com/office/drawing/2014/main" xmlns="" id="{B4B1FE1F-6CD7-654F-8F56-C2F661931D17}"/>
+              </a:ext>
+            </a:extLst>
+          </p:cNvPr>
+          <p:cNvSpPr txBox="1"/>
+          <p:nvPr/>
+        </p:nvSpPr>
+        <p:spPr>
+          <a:xfrm>
+            <a:off x="323528" y="169585"/>
+            <a:ext cx="6552728" cy="461665"/>
+          </a:xfrm>
+          <a:prstGeom prst="rect">
+            <a:avLst/>
+          </a:prstGeom>
+          <a:noFill/>
+        </p:spPr>
+        <p:txBody>
+          <a:bodyPr wrap="square" rtlCol="0">
+            <a:spAutoFit/>
+          </a:bodyPr>
+          <a:lstStyle/>
+          <a:p>
+            <a:r>
+              <a:rPr lang="en-US" altLang="ko-KR" sz="2400" b="1" dirty="0">
+                <a:latin typeface="Arial" panose="020B0604020202020204" pitchFamily="34" charset="0"/>
+                <a:cs typeface="Arial" panose="020B0604020202020204" pitchFamily="34" charset="0"/>
+              </a:rPr>
+              <a:t>Course Lesson &amp; Learned</a:t>
+            </a:r>
+          </a:p>
+        </p:txBody>
+      </p:sp>
+      <p:pic>
+        <p:nvPicPr>
+          <p:cNvPr id="8" name="그림 7">
+            <a:extLst>
+              <a:ext uri="{FF2B5EF4-FFF2-40B4-BE49-F238E27FC236}">
+                <a16:creationId xmlns:a16="http://schemas.microsoft.com/office/drawing/2014/main" xmlns="" id="{434B5C57-8B8B-1A4A-B338-3D39BA11B5B9}"/>
+              </a:ext>
+            </a:extLst>
+          </p:cNvPr>
+          <p:cNvPicPr>
+            <a:picLocks noChangeAspect="1"/>
+          </p:cNvPicPr>
+          <p:nvPr/>
+        </p:nvPicPr>
+        <p:blipFill>
+          <a:blip r:embed="rId3" cstate="print">
+            <a:extLst>
+              <a:ext uri="{28A0092B-C50C-407E-A947-70E740481C1C}">
+                <a14:useLocalDpi xmlns:a14="http://schemas.microsoft.com/office/drawing/2010/main" val="0"/>
+              </a:ext>
+            </a:extLst>
+          </a:blip>
+          <a:stretch>
+            <a:fillRect/>
+          </a:stretch>
+        </p:blipFill>
+        <p:spPr>
+          <a:xfrm>
+            <a:off x="7705687" y="187319"/>
+            <a:ext cx="1047328" cy="584802"/>
+          </a:xfrm>
+          <a:prstGeom prst="rect">
+            <a:avLst/>
+          </a:prstGeom>
+        </p:spPr>
+      </p:pic>
+      <p:sp>
+        <p:nvSpPr>
+          <p:cNvPr id="2" name="TextBox 1"/>
+          <p:cNvSpPr txBox="1"/>
+          <p:nvPr/>
+        </p:nvSpPr>
+        <p:spPr>
+          <a:xfrm>
+            <a:off x="395536" y="836712"/>
+            <a:ext cx="266420" cy="369332"/>
+          </a:xfrm>
+          <a:prstGeom prst="rect">
+            <a:avLst/>
+          </a:prstGeom>
+          <a:noFill/>
+        </p:spPr>
+        <p:txBody>
+          <a:bodyPr wrap="none" rtlCol="0">
+            <a:spAutoFit/>
+          </a:bodyPr>
+          <a:lstStyle/>
+          <a:p>
+            <a:r>
+              <a:rPr lang="ko-KR" altLang="en-US" dirty="0" smtClean="0"/>
+              <a:t> </a:t>
+            </a:r>
+            <a:endParaRPr lang="ko-KR" altLang="en-US" dirty="0"/>
+          </a:p>
+        </p:txBody>
+      </p:sp>
+      <p:sp>
+        <p:nvSpPr>
+          <p:cNvPr id="3" name="직사각형 2"/>
+          <p:cNvSpPr/>
+          <p:nvPr/>
+        </p:nvSpPr>
+        <p:spPr>
+          <a:xfrm>
+            <a:off x="132702" y="980728"/>
+            <a:ext cx="7895682" cy="1695336"/>
+          </a:xfrm>
+          <a:prstGeom prst="rect">
+            <a:avLst/>
+          </a:prstGeom>
+        </p:spPr>
+        <p:txBody>
+          <a:bodyPr wrap="square">
+            <a:spAutoFit/>
+          </a:bodyPr>
+          <a:lstStyle/>
+          <a:p>
+            <a:pPr marL="742950" lvl="1" indent="-285750">
+              <a:lnSpc>
+                <a:spcPts val="2500"/>
+              </a:lnSpc>
+              <a:buFont typeface="Wingdings" panose="05000000000000000000" pitchFamily="2" charset="2"/>
+              <a:buChar char="§"/>
+            </a:pPr>
+            <a:endParaRPr lang="en-US" altLang="ko-KR" sz="1700" dirty="0">
+              <a:solidFill>
+                <a:schemeClr val="tx1">
+                  <a:lumMod val="95000"/>
+                  <a:lumOff val="5000"/>
+                </a:schemeClr>
+              </a:solidFill>
+              <a:latin typeface="Arial" panose="020B0604020202020204" pitchFamily="34" charset="0"/>
+              <a:cs typeface="Arial" panose="020B0604020202020204" pitchFamily="34" charset="0"/>
+            </a:endParaRPr>
+          </a:p>
+          <a:p>
+            <a:pPr marL="742950" lvl="1" indent="-285750">
+              <a:lnSpc>
+                <a:spcPts val="2500"/>
+              </a:lnSpc>
+              <a:buFont typeface="Wingdings" panose="05000000000000000000" pitchFamily="2" charset="2"/>
+              <a:buChar char="§"/>
+            </a:pPr>
+            <a:r>
+              <a:rPr lang="en-US" altLang="ko-KR" sz="1700" b="1" dirty="0" err="1">
+                <a:solidFill>
+                  <a:schemeClr val="tx1">
+                    <a:lumMod val="95000"/>
+                    <a:lumOff val="5000"/>
+                  </a:schemeClr>
+                </a:solidFill>
+                <a:latin typeface="Arial" panose="020B0604020202020204" pitchFamily="34" charset="0"/>
+                <a:cs typeface="Arial" panose="020B0604020202020204" pitchFamily="34" charset="0"/>
+              </a:rPr>
+              <a:t>Hyoyeon</a:t>
+            </a:r>
+            <a:r>
+              <a:rPr lang="en-US" altLang="ko-KR" sz="1700" b="1" dirty="0">
+                <a:solidFill>
+                  <a:schemeClr val="tx1">
+                    <a:lumMod val="95000"/>
+                    <a:lumOff val="5000"/>
+                  </a:schemeClr>
+                </a:solidFill>
+                <a:latin typeface="Arial" panose="020B0604020202020204" pitchFamily="34" charset="0"/>
+                <a:cs typeface="Arial" panose="020B0604020202020204" pitchFamily="34" charset="0"/>
+              </a:rPr>
+              <a:t> </a:t>
+            </a:r>
+            <a:r>
+              <a:rPr lang="en-US" altLang="ko-KR" sz="1700" b="1" dirty="0" smtClean="0">
+                <a:solidFill>
+                  <a:schemeClr val="tx1">
+                    <a:lumMod val="95000"/>
+                    <a:lumOff val="5000"/>
+                  </a:schemeClr>
+                </a:solidFill>
+                <a:latin typeface="Arial" panose="020B0604020202020204" pitchFamily="34" charset="0"/>
+                <a:cs typeface="Arial" panose="020B0604020202020204" pitchFamily="34" charset="0"/>
+              </a:rPr>
+              <a:t>Hwang</a:t>
+            </a:r>
+          </a:p>
+          <a:p>
+            <a:pPr lvl="1">
+              <a:lnSpc>
+                <a:spcPts val="2500"/>
+              </a:lnSpc>
+            </a:pPr>
+            <a:r>
+              <a:rPr lang="en-US" altLang="ko-KR" sz="1700" dirty="0" smtClean="0">
+                <a:solidFill>
+                  <a:schemeClr val="tx1">
+                    <a:lumMod val="95000"/>
+                    <a:lumOff val="5000"/>
+                  </a:schemeClr>
+                </a:solidFill>
+                <a:latin typeface="Arial" panose="020B0604020202020204" pitchFamily="34" charset="0"/>
+                <a:cs typeface="Arial" panose="020B0604020202020204" pitchFamily="34" charset="0"/>
+              </a:rPr>
+              <a:t>    - </a:t>
+            </a:r>
+            <a:r>
+              <a:rPr lang="en-US" altLang="ko-KR" sz="1700" dirty="0">
+                <a:solidFill>
+                  <a:schemeClr val="tx1">
+                    <a:lumMod val="95000"/>
+                    <a:lumOff val="5000"/>
+                  </a:schemeClr>
+                </a:solidFill>
+                <a:latin typeface="Arial" panose="020B0604020202020204" pitchFamily="34" charset="0"/>
+                <a:cs typeface="Arial" panose="020B0604020202020204" pitchFamily="34" charset="0"/>
+              </a:rPr>
+              <a:t>It was a good time to experience the work of the test engineer while we were working on the project. As a test manager, I will try to apply what I learned in this course to my work.</a:t>
+            </a:r>
+            <a:endParaRPr lang="en-US" altLang="ko-KR" sz="1700" dirty="0">
+              <a:solidFill>
+                <a:schemeClr val="tx1">
+                  <a:lumMod val="95000"/>
+                  <a:lumOff val="5000"/>
+                </a:schemeClr>
+              </a:solidFill>
+              <a:latin typeface="Arial" panose="020B0604020202020204" pitchFamily="34" charset="0"/>
+              <a:cs typeface="Arial" panose="020B0604020202020204" pitchFamily="34" charset="0"/>
+            </a:endParaRPr>
+          </a:p>
+        </p:txBody>
+      </p:sp>
+    </p:spTree>
+    <p:extLst>
+      <p:ext uri="{BB962C8B-B14F-4D97-AF65-F5344CB8AC3E}">
+        <p14:creationId xmlns:p14="http://schemas.microsoft.com/office/powerpoint/2010/main" val="1765878717"/>
+      </p:ext>
+    </p:extLst>
+  </p:cSld>
+  <p:clrMapOvr>
+    <a:masterClrMapping/>
+  </p:clrMapOvr>
+  <p:timing>
+    <p:tnLst>
+      <p:par>
+        <p:cTn id="1" dur="indefinite" restart="never" nodeType="tmRoot"/>
+      </p:par>
+    </p:tnLst>
+  </p:timing>
+</p:sld>
+</file>
+
+<file path=ppt/slides/slide6.xml><?xml version="1.0" encoding="utf-8"?>
+<p:sld xmlns:a="http://schemas.openxmlformats.org/drawingml/2006/main" xmlns:r="http://schemas.openxmlformats.org/officeDocument/2006/relationships" xmlns:p="http://schemas.openxmlformats.org/presentationml/2006/main">
+  <p:cSld>
+    <p:spTree>
+      <p:nvGrpSpPr>
+        <p:cNvPr id="1" name=""/>
+        <p:cNvGrpSpPr/>
+        <p:nvPr/>
+      </p:nvGrpSpPr>
+      <p:grpSpPr>
+        <a:xfrm>
+          <a:off x="0" y="0"/>
+          <a:ext cx="0" cy="0"/>
+          <a:chOff x="0" y="0"/>
+          <a:chExt cx="0" cy="0"/>
+        </a:xfrm>
+      </p:grpSpPr>
+      <p:sp>
+        <p:nvSpPr>
+          <p:cNvPr id="5" name="슬라이드 번호 개체 틀 4">
+            <a:extLst>
+              <a:ext uri="{FF2B5EF4-FFF2-40B4-BE49-F238E27FC236}">
+                <a16:creationId xmlns="" xmlns:a16="http://schemas.microsoft.com/office/drawing/2014/main" id="{9FA75F19-B7A8-6A4F-A5D3-84D9FFF88627}"/>
+              </a:ext>
+            </a:extLst>
+          </p:cNvPr>
+          <p:cNvSpPr>
+            <a:spLocks noGrp="1"/>
+          </p:cNvSpPr>
+          <p:nvPr>
+            <p:ph type="sldNum" sz="quarter" idx="12"/>
+          </p:nvPr>
+        </p:nvSpPr>
+        <p:spPr/>
+        <p:txBody>
+          <a:bodyPr/>
+          <a:lstStyle/>
+          <a:p>
+            <a:fld id="{80E8D238-1282-4047-ADCD-348209F756B1}" type="slidenum">
+              <a:rPr lang="ko-KR" altLang="en-US" sz="1400" b="1" smtClean="0"/>
+              <a:t>6</a:t>
+            </a:fld>
+            <a:endParaRPr lang="ko-KR" altLang="en-US" sz="1400" b="1" dirty="0"/>
+          </a:p>
+        </p:txBody>
+      </p:sp>
+      <p:sp>
+        <p:nvSpPr>
+          <p:cNvPr id="7" name="TextBox 6">
+            <a:extLst>
+              <a:ext uri="{FF2B5EF4-FFF2-40B4-BE49-F238E27FC236}">
+                <a16:creationId xmlns="" xmlns:a16="http://schemas.microsoft.com/office/drawing/2014/main" id="{B4B1FE1F-6CD7-654F-8F56-C2F661931D17}"/>
               </a:ext>
             </a:extLst>
           </p:cNvPr>
@@ -6002,7 +6473,7 @@
           <p:cNvPr id="8" name="그림 7">
             <a:extLst>
               <a:ext uri="{FF2B5EF4-FFF2-40B4-BE49-F238E27FC236}">
-                <a16:creationId xmlns:a16="http://schemas.microsoft.com/office/drawing/2014/main" xmlns="" id="{434B5C57-8B8B-1A4A-B338-3D39BA11B5B9}"/>
+                <a16:creationId xmlns="" xmlns:a16="http://schemas.microsoft.com/office/drawing/2014/main" id="{434B5C57-8B8B-1A4A-B338-3D39BA11B5B9}"/>
               </a:ext>
             </a:extLst>
           </p:cNvPr>
@@ -6315,7 +6786,7 @@
 </p:sld>
 </file>
 
-<file path=ppt/slides/slide6.xml><?xml version="1.0" encoding="utf-8"?>
+<file path=ppt/slides/slide7.xml><?xml version="1.0" encoding="utf-8"?>
 <p:sld xmlns:a="http://schemas.openxmlformats.org/drawingml/2006/main" xmlns:r="http://schemas.openxmlformats.org/officeDocument/2006/relationships" xmlns:p="http://schemas.openxmlformats.org/presentationml/2006/main">
   <p:cSld>
     <p:spTree>
@@ -6337,7 +6808,7 @@
           <p:cNvPr id="5" name="슬라이드 번호 개체 틀 4">
             <a:extLst>
               <a:ext uri="{FF2B5EF4-FFF2-40B4-BE49-F238E27FC236}">
-                <a16:creationId xmlns:a16="http://schemas.microsoft.com/office/drawing/2014/main" xmlns="" id="{9FA75F19-B7A8-6A4F-A5D3-84D9FFF88627}"/>
+                <a16:creationId xmlns="" xmlns:a16="http://schemas.microsoft.com/office/drawing/2014/main" id="{9FA75F19-B7A8-6A4F-A5D3-84D9FFF88627}"/>
               </a:ext>
             </a:extLst>
           </p:cNvPr>
@@ -6355,7 +6826,7 @@
           <a:p>
             <a:fld id="{80E8D238-1282-4047-ADCD-348209F756B1}" type="slidenum">
               <a:rPr lang="ko-KR" altLang="en-US" sz="1400" b="1" smtClean="0"/>
-              <a:t>6</a:t>
+              <a:t>7</a:t>
             </a:fld>
             <a:endParaRPr lang="ko-KR" altLang="en-US" sz="1400" b="1" dirty="0"/>
           </a:p>
@@ -6366,7 +6837,7 @@
           <p:cNvPr id="7" name="TextBox 6">
             <a:extLst>
               <a:ext uri="{FF2B5EF4-FFF2-40B4-BE49-F238E27FC236}">
-                <a16:creationId xmlns:a16="http://schemas.microsoft.com/office/drawing/2014/main" xmlns="" id="{B4B1FE1F-6CD7-654F-8F56-C2F661931D17}"/>
+                <a16:creationId xmlns="" xmlns:a16="http://schemas.microsoft.com/office/drawing/2014/main" id="{B4B1FE1F-6CD7-654F-8F56-C2F661931D17}"/>
               </a:ext>
             </a:extLst>
           </p:cNvPr>
@@ -6402,7 +6873,7 @@
           <p:cNvPr id="8" name="그림 7">
             <a:extLst>
               <a:ext uri="{FF2B5EF4-FFF2-40B4-BE49-F238E27FC236}">
-                <a16:creationId xmlns:a16="http://schemas.microsoft.com/office/drawing/2014/main" xmlns="" id="{434B5C57-8B8B-1A4A-B338-3D39BA11B5B9}"/>
+                <a16:creationId xmlns="" xmlns:a16="http://schemas.microsoft.com/office/drawing/2014/main" id="{434B5C57-8B8B-1A4A-B338-3D39BA11B5B9}"/>
               </a:ext>
             </a:extLst>
           </p:cNvPr>

</xml_diff>